<commit_message>
added china data 2.0
</commit_message>
<xml_diff>
--- a/05_Presentation/aiddata_presentation.pptx
+++ b/05_Presentation/aiddata_presentation.pptx
@@ -31,7 +31,6 @@
     <p:sldId id="279" r:id="rId25"/>
     <p:sldId id="280" r:id="rId26"/>
     <p:sldId id="281" r:id="rId27"/>
-    <p:sldId id="282" r:id="rId28"/>
   </p:sldIdLst>
   <p:sldSz cx="12192000" cy="6858000"/>
   <p:notesSz cx="6858000" cy="9144000"/>
@@ -3295,7 +3294,7 @@
             </a:pPr>
             <a:r>
               <a:rPr/>
-              <a:t>Our Data</a:t>
+              <a:t>The Underlying Logic</a:t>
             </a:r>
           </a:p>
         </p:txBody>
@@ -3320,49 +3319,43 @@
             </a:pPr>
             <a:r>
               <a:rPr/>
-              <a:t>Explanatory Variables:</a:t>
+              <a:t>Two dimensions of Beijing’s public diplomacy:</a:t>
             </a:r>
           </a:p>
           <a:p>
             <a:pPr lvl="0"/>
             <a:r>
               <a:rPr/>
-              <a:t>AidData’s </a:t>
+              <a:t>“South-South” diplomatic visits</a:t>
+            </a:r>
+          </a:p>
+          <a:p>
+            <a:pPr lvl="1"/>
+            <a:r>
+              <a:rPr/>
+              <a:t>Visible and symbolic show of support and aligment</a:t>
+            </a:r>
+          </a:p>
+          <a:p>
+            <a:pPr lvl="0"/>
+            <a:r>
+              <a:rPr/>
+              <a:t>State-sponsored </a:t>
             </a:r>
             <a:r>
               <a:rPr i="1"/>
-              <a:t>China’s Public Diplomacy Dashboard</a:t>
-            </a:r>
-          </a:p>
-          <a:p>
-            <a:pPr lvl="0"/>
-            <a:r>
-              <a:rPr/>
-              <a:t>Cline Center for Advanced Social Research’s </a:t>
-            </a:r>
-            <a:r>
-              <a:rPr i="1"/>
-              <a:t>Global News Index and Extracted Features Repository</a:t>
-            </a:r>
-          </a:p>
-          <a:p>
-            <a:pPr lvl="0" indent="0" marL="0">
-              <a:buNone/>
-            </a:pPr>
-            <a:r>
-              <a:rPr/>
-              <a:t>Outcome:</a:t>
-            </a:r>
-          </a:p>
-          <a:p>
-            <a:pPr lvl="0"/>
-            <a:r>
-              <a:rPr/>
-              <a:t>AidData’s </a:t>
-            </a:r>
-            <a:r>
-              <a:rPr i="1"/>
-              <a:t>Global Chinese Development Finance Dataset</a:t>
+              <a:t>Xinhua</a:t>
+            </a:r>
+            <a:r>
+              <a:rPr/>
+              <a:t> coverage of developing countries</a:t>
+            </a:r>
+          </a:p>
+          <a:p>
+            <a:pPr lvl="1"/>
+            <a:r>
+              <a:rPr/>
+              <a:t>Agenda-setting tool and signal of Beijing’s priorities for foreign audiences</a:t>
             </a:r>
           </a:p>
         </p:txBody>
@@ -3419,160 +3412,6 @@
 </file>
 
 <file path=ppt/slides/slide11.xml><?xml version="1.0" encoding="utf-8"?>
-<p:sld xmlns:a="http://schemas.openxmlformats.org/drawingml/2006/main" xmlns:r="http://schemas.openxmlformats.org/officeDocument/2006/relationships" xmlns:p="http://schemas.openxmlformats.org/presentationml/2006/main">
-  <p:cSld>
-    <p:spTree>
-      <p:nvGrpSpPr>
-        <p:cNvPr id="1" name=""/>
-        <p:cNvGrpSpPr/>
-        <p:nvPr/>
-      </p:nvGrpSpPr>
-      <p:grpSpPr>
-        <a:xfrm>
-          <a:off x="0" y="0"/>
-          <a:ext cx="0" cy="0"/>
-          <a:chOff x="0" y="0"/>
-          <a:chExt cx="0" cy="0"/>
-        </a:xfrm>
-      </p:grpSpPr>
-      <p:sp>
-        <p:nvSpPr>
-          <p:cNvPr id="2" name="Title 1"/>
-          <p:cNvSpPr>
-            <a:spLocks noGrp="1"/>
-          </p:cNvSpPr>
-          <p:nvPr>
-            <p:ph type="title"/>
-          </p:nvPr>
-        </p:nvSpPr>
-        <p:spPr/>
-        <p:txBody>
-          <a:bodyPr/>
-          <a:lstStyle/>
-          <a:p>
-            <a:pPr lvl="0" indent="0" marL="0">
-              <a:buNone/>
-            </a:pPr>
-            <a:r>
-              <a:rPr/>
-              <a:t>The Underlying Logic</a:t>
-            </a:r>
-          </a:p>
-        </p:txBody>
-      </p:sp>
-      <p:sp>
-        <p:nvSpPr>
-          <p:cNvPr id="3" name="Content Placeholder 2"/>
-          <p:cNvSpPr>
-            <a:spLocks noGrp="1"/>
-          </p:cNvSpPr>
-          <p:nvPr>
-            <p:ph idx="1"/>
-          </p:nvPr>
-        </p:nvSpPr>
-        <p:spPr/>
-        <p:txBody>
-          <a:bodyPr/>
-          <a:lstStyle/>
-          <a:p>
-            <a:pPr lvl="0" indent="0" marL="0">
-              <a:buNone/>
-            </a:pPr>
-            <a:r>
-              <a:rPr/>
-              <a:t>Two dimensions of Beijing’s public diplomacy:</a:t>
-            </a:r>
-          </a:p>
-          <a:p>
-            <a:pPr lvl="0"/>
-            <a:r>
-              <a:rPr/>
-              <a:t>“South-South” diplomatic visits</a:t>
-            </a:r>
-          </a:p>
-          <a:p>
-            <a:pPr lvl="1"/>
-            <a:r>
-              <a:rPr/>
-              <a:t>Visible and symbolic show of support and aligment</a:t>
-            </a:r>
-          </a:p>
-          <a:p>
-            <a:pPr lvl="0"/>
-            <a:r>
-              <a:rPr/>
-              <a:t>State-sponsored </a:t>
-            </a:r>
-            <a:r>
-              <a:rPr i="1"/>
-              <a:t>Xinhua</a:t>
-            </a:r>
-            <a:r>
-              <a:rPr/>
-              <a:t> coverage of developing countries</a:t>
-            </a:r>
-          </a:p>
-          <a:p>
-            <a:pPr lvl="1"/>
-            <a:r>
-              <a:rPr/>
-              <a:t>Agenda-setting tool and signal of Beijing’s priorities for foreign audiences</a:t>
-            </a:r>
-          </a:p>
-        </p:txBody>
-      </p:sp>
-      <p:sp>
-        <p:nvSpPr>
-          <p:cNvPr id="4" name="Date Placeholder 3"/>
-          <p:cNvSpPr>
-            <a:spLocks noGrp="1"/>
-          </p:cNvSpPr>
-          <p:nvPr>
-            <p:ph idx="10" sz="half" type="dt"/>
-          </p:nvPr>
-        </p:nvSpPr>
-        <p:spPr/>
-        <p:txBody>
-          <a:bodyPr/>
-          <a:lstStyle/>
-          <a:p>
-            <a:r>
-              <a:rPr lang="en-US" smtClean="0"/>
-              <a:t>June 24, 2022</a:t>
-            </a:r>
-            <a:endParaRPr lang="en-US"/>
-          </a:p>
-        </p:txBody>
-      </p:sp>
-      <p:sp>
-        <p:nvSpPr>
-          <p:cNvPr id="6" name="Slide Number Placeholder 5"/>
-          <p:cNvSpPr>
-            <a:spLocks noGrp="1"/>
-          </p:cNvSpPr>
-          <p:nvPr>
-            <p:ph idx="12" sz="quarter" type="sldNum"/>
-          </p:nvPr>
-        </p:nvSpPr>
-        <p:spPr/>
-        <p:txBody>
-          <a:bodyPr/>
-          <a:lstStyle/>
-          <a:p>
-            <a:fld id="{97EA7C9C-6196-4EEE-BF90-A4DA6D831FB5}" type="slidenum">
-              <a:rPr lang="en-US" smtClean="0"/>
-              <a:t>‹#›</a:t>
-            </a:fld>
-            <a:endParaRPr lang="en-US"/>
-          </a:p>
-        </p:txBody>
-      </p:sp>
-    </p:spTree>
-  </p:cSld>
-</p:sld>
-</file>
-
-<file path=ppt/slides/slide12.xml><?xml version="1.0" encoding="utf-8"?>
 <p:sld xmlns:a="http://schemas.openxmlformats.org/drawingml/2006/main" xmlns:r="http://schemas.openxmlformats.org/officeDocument/2006/relationships" xmlns:p="http://schemas.openxmlformats.org/presentationml/2006/main">
   <p:cSld>
     <p:spTree>
@@ -3736,6 +3575,140 @@
 </p:sld>
 </file>
 
+<file path=ppt/slides/slide12.xml><?xml version="1.0" encoding="utf-8"?>
+<p:sld xmlns:a="http://schemas.openxmlformats.org/drawingml/2006/main" xmlns:r="http://schemas.openxmlformats.org/officeDocument/2006/relationships" xmlns:p="http://schemas.openxmlformats.org/presentationml/2006/main">
+  <p:cSld>
+    <p:spTree>
+      <p:nvGrpSpPr>
+        <p:cNvPr id="1" name=""/>
+        <p:cNvGrpSpPr/>
+        <p:nvPr/>
+      </p:nvGrpSpPr>
+      <p:grpSpPr>
+        <a:xfrm>
+          <a:off x="0" y="0"/>
+          <a:ext cx="0" cy="0"/>
+          <a:chOff x="0" y="0"/>
+          <a:chExt cx="0" cy="0"/>
+        </a:xfrm>
+      </p:grpSpPr>
+      <p:sp>
+        <p:nvSpPr>
+          <p:cNvPr id="2" name="Title 1"/>
+          <p:cNvSpPr>
+            <a:spLocks noGrp="1"/>
+          </p:cNvSpPr>
+          <p:nvPr>
+            <p:ph type="title"/>
+          </p:nvPr>
+        </p:nvSpPr>
+        <p:spPr/>
+        <p:txBody>
+          <a:bodyPr/>
+          <a:lstStyle/>
+          <a:p>
+            <a:pPr lvl="0" indent="0" marL="0">
+              <a:buNone/>
+            </a:pPr>
+            <a:r>
+              <a:rPr/>
+              <a:t>Why this Matters</a:t>
+            </a:r>
+          </a:p>
+        </p:txBody>
+      </p:sp>
+      <p:sp>
+        <p:nvSpPr>
+          <p:cNvPr id="3" name="Content Placeholder 2"/>
+          <p:cNvSpPr>
+            <a:spLocks noGrp="1"/>
+          </p:cNvSpPr>
+          <p:nvPr>
+            <p:ph idx="1"/>
+          </p:nvPr>
+        </p:nvSpPr>
+        <p:spPr/>
+        <p:txBody>
+          <a:bodyPr/>
+          <a:lstStyle/>
+          <a:p>
+            <a:pPr lvl="0" indent="0" marL="0">
+              <a:buNone/>
+            </a:pPr>
+            <a:r>
+              <a:rPr/>
+              <a:t>These results don’t just support the view </a:t>
+            </a:r>
+            <a:r>
+              <a:rPr b="1"/>
+              <a:t>that</a:t>
+            </a:r>
+            <a:r>
+              <a:rPr/>
+              <a:t> Beijing uses aid to support diplomatic and goals and promote its agenda. They show </a:t>
+            </a:r>
+            <a:r>
+              <a:rPr b="1"/>
+              <a:t>how</a:t>
+            </a:r>
+            <a:r>
+              <a:rPr/>
+              <a:t> Beijing uses aid to accomplish these goals.</a:t>
+            </a:r>
+          </a:p>
+        </p:txBody>
+      </p:sp>
+      <p:sp>
+        <p:nvSpPr>
+          <p:cNvPr id="4" name="Date Placeholder 3"/>
+          <p:cNvSpPr>
+            <a:spLocks noGrp="1"/>
+          </p:cNvSpPr>
+          <p:nvPr>
+            <p:ph idx="10" sz="half" type="dt"/>
+          </p:nvPr>
+        </p:nvSpPr>
+        <p:spPr/>
+        <p:txBody>
+          <a:bodyPr/>
+          <a:lstStyle/>
+          <a:p>
+            <a:r>
+              <a:rPr lang="en-US" smtClean="0"/>
+              <a:t>June 24, 2022</a:t>
+            </a:r>
+            <a:endParaRPr lang="en-US"/>
+          </a:p>
+        </p:txBody>
+      </p:sp>
+      <p:sp>
+        <p:nvSpPr>
+          <p:cNvPr id="6" name="Slide Number Placeholder 5"/>
+          <p:cNvSpPr>
+            <a:spLocks noGrp="1"/>
+          </p:cNvSpPr>
+          <p:nvPr>
+            <p:ph idx="12" sz="quarter" type="sldNum"/>
+          </p:nvPr>
+        </p:nvSpPr>
+        <p:spPr/>
+        <p:txBody>
+          <a:bodyPr/>
+          <a:lstStyle/>
+          <a:p>
+            <a:fld id="{97EA7C9C-6196-4EEE-BF90-A4DA6D831FB5}" type="slidenum">
+              <a:rPr lang="en-US" smtClean="0"/>
+              <a:t>‹#›</a:t>
+            </a:fld>
+            <a:endParaRPr lang="en-US"/>
+          </a:p>
+        </p:txBody>
+      </p:sp>
+    </p:spTree>
+  </p:cSld>
+</p:sld>
+</file>
+
 <file path=ppt/slides/slide13.xml><?xml version="1.0" encoding="utf-8"?>
 <p:sld xmlns:a="http://schemas.openxmlformats.org/drawingml/2006/main" xmlns:r="http://schemas.openxmlformats.org/officeDocument/2006/relationships" xmlns:p="http://schemas.openxmlformats.org/presentationml/2006/main">
   <p:cSld>
@@ -3798,23 +3771,7 @@
             </a:pPr>
             <a:r>
               <a:rPr/>
-              <a:t>These results don’t just support the view </a:t>
-            </a:r>
-            <a:r>
-              <a:rPr b="1"/>
-              <a:t>that</a:t>
-            </a:r>
-            <a:r>
-              <a:rPr/>
-              <a:t> Beijing uses aid to support diplomatic and goals and promote its agenda. They show </a:t>
-            </a:r>
-            <a:r>
-              <a:rPr b="1"/>
-              <a:t>how</a:t>
-            </a:r>
-            <a:r>
-              <a:rPr/>
-              <a:t> Beijing uses aid to accomplish these goals.</a:t>
+              <a:t>Visits and coverage put a spotlight on China’s priorities, while aid provides material backing that these visible signals are more than hollow performances.</a:t>
             </a:r>
           </a:p>
         </p:txBody>
@@ -3907,7 +3864,7 @@
             </a:pPr>
             <a:r>
               <a:rPr/>
-              <a:t>Why this Matters</a:t>
+              <a:t>Diplomacy and Media in China’s Foreign Policy</a:t>
             </a:r>
           </a:p>
         </p:txBody>
@@ -3931,8 +3888,16 @@
               <a:buNone/>
             </a:pPr>
             <a:r>
-              <a:rPr/>
-              <a:t>Visits and coverage put a spotlight on China’s priorities, while aid provides material backing that these visible signals are more than hollow performances.</a:t>
+              <a:rPr b="1"/>
+              <a:t>Why focus on diplomatic visits and external-facing state-run media coverage in </a:t>
+            </a:r>
+            <a:r>
+              <a:rPr b="1" i="1"/>
+              <a:t>Xinhua</a:t>
+            </a:r>
+            <a:r>
+              <a:rPr b="1"/>
+              <a:t>?</a:t>
             </a:r>
           </a:p>
         </p:txBody>
@@ -4025,7 +3990,7 @@
             </a:pPr>
             <a:r>
               <a:rPr/>
-              <a:t>Diplomacy and Media in China’s Foreign Policy</a:t>
+              <a:t>Diplomacy</a:t>
             </a:r>
           </a:p>
         </p:txBody>
@@ -4045,20 +4010,24 @@
           <a:bodyPr/>
           <a:lstStyle/>
           <a:p>
-            <a:pPr lvl="0" indent="0" marL="0">
-              <a:buNone/>
-            </a:pPr>
-            <a:r>
-              <a:rPr b="1"/>
-              <a:t>Why focus on diplomatic visits and external-facing state-run media coverage in </a:t>
-            </a:r>
-            <a:r>
-              <a:rPr b="1" i="1"/>
-              <a:t>Xinhua</a:t>
-            </a:r>
-            <a:r>
-              <a:rPr b="1"/>
-              <a:t>?</a:t>
+            <a:pPr lvl="0"/>
+            <a:r>
+              <a:rPr/>
+              <a:t>Visiting leaders can increase the awareness of themselves and their country among citizens in the host country (Goldsmith and Horiuchi, 2009; Goldsmith et al., 2021)</a:t>
+            </a:r>
+          </a:p>
+          <a:p>
+            <a:pPr lvl="0"/>
+            <a:r>
+              <a:rPr/>
+              <a:t>Diplomatic visits usually come with a policy agenda between two countries, and the two are expected to cooperate in various domains through their negotiations.</a:t>
+            </a:r>
+          </a:p>
+          <a:p>
+            <a:pPr lvl="0"/>
+            <a:r>
+              <a:rPr/>
+              <a:t>Diplomatic visit is a signal of support and closeness of countries.</a:t>
             </a:r>
           </a:p>
         </p:txBody>
@@ -4151,7 +4120,7 @@
             </a:pPr>
             <a:r>
               <a:rPr/>
-              <a:t>Diplomacy</a:t>
+              <a:t>Outward Facing Media Coverage</a:t>
             </a:r>
           </a:p>
         </p:txBody>
@@ -4174,21 +4143,46 @@
             <a:pPr lvl="0"/>
             <a:r>
               <a:rPr/>
-              <a:t>Visiting leaders can increase the awareness of themselves and their country among citizens in the host country (Goldsmith and Horiuchi, 2009; Goldsmith et al., 2021)</a:t>
+              <a:t>What’s covered in the news signals to the public what is important (McCombs and Shaw, 1972)</a:t>
             </a:r>
           </a:p>
           <a:p>
             <a:pPr lvl="0"/>
             <a:r>
               <a:rPr/>
-              <a:t>Diplomatic visits usually come with policy agenda between two countries, and the two are expected to cooperate in various domains through their negotiations.</a:t>
+              <a:t>Media are critical in building states’ image to international audiences (Nye, 2008)</a:t>
             </a:r>
           </a:p>
           <a:p>
             <a:pPr lvl="0"/>
             <a:r>
               <a:rPr/>
-              <a:t>Diplomatic visit is a signal of support and closeness of countries.</a:t>
+              <a:t>Media coverage shapes public attitudes — core objective of mediated public diplomacy. (Entman, 2008; Kiousis and Wu, 2008)</a:t>
+            </a:r>
+          </a:p>
+          <a:p>
+            <a:pPr lvl="0"/>
+            <a:r>
+              <a:rPr i="1"/>
+              <a:t>Xinhua</a:t>
+            </a:r>
+            <a:r>
+              <a:rPr/>
+              <a:t> has dual roles:</a:t>
+            </a:r>
+          </a:p>
+          <a:p>
+            <a:pPr lvl="1"/>
+            <a:r>
+              <a:rPr/>
+              <a:t>Reporting news</a:t>
+            </a:r>
+          </a:p>
+          <a:p>
+            <a:pPr lvl="1"/>
+            <a:r>
+              <a:rPr/>
+              <a:t>Building up China’s image (e.g., Beijing’s “going out” strategy — Shambaug, 2015)</a:t>
             </a:r>
           </a:p>
         </p:txBody>
@@ -4281,7 +4275,7 @@
             </a:pPr>
             <a:r>
               <a:rPr/>
-              <a:t>Outward Facing Media Coverage</a:t>
+              <a:t>Diplomacy and Media and China’s Foreign Policy</a:t>
             </a:r>
           </a:p>
         </p:txBody>
@@ -4301,49 +4295,36 @@
           <a:bodyPr/>
           <a:lstStyle/>
           <a:p>
-            <a:pPr lvl="0"/>
-            <a:r>
-              <a:rPr/>
-              <a:t>What’s covered in the news signals to the public what is important (McCombs and Shaw, 1972)</a:t>
-            </a:r>
-          </a:p>
-          <a:p>
-            <a:pPr lvl="0"/>
-            <a:r>
-              <a:rPr/>
-              <a:t>Media are critical in building states’ image to international audiences (Nye, 2008)</a:t>
-            </a:r>
-          </a:p>
-          <a:p>
-            <a:pPr lvl="0"/>
-            <a:r>
-              <a:rPr/>
-              <a:t>Media coverage shapes public attitudes — core objective of mediated public diplomacy. (Entman, 2008; Kiousis and Wu, 2008)</a:t>
-            </a:r>
-          </a:p>
-          <a:p>
-            <a:pPr lvl="0"/>
-            <a:r>
-              <a:rPr i="1"/>
-              <a:t>Xinhua</a:t>
-            </a:r>
-            <a:r>
-              <a:rPr/>
-              <a:t> has dual roles:</a:t>
-            </a:r>
-          </a:p>
-          <a:p>
-            <a:pPr lvl="1"/>
-            <a:r>
-              <a:rPr/>
-              <a:t>Reporting news</a:t>
-            </a:r>
-          </a:p>
-          <a:p>
-            <a:pPr lvl="1"/>
-            <a:r>
-              <a:rPr/>
-              <a:t>Building up China’s image (e.g., Beijing’s “going out” strategy — Shambaug, 2015)</a:t>
+            <a:pPr lvl="0" indent="0" marL="0">
+              <a:buNone/>
+            </a:pPr>
+            <a:r>
+              <a:rPr/>
+              <a:t>Visits and outward media coverage are </a:t>
+            </a:r>
+            <a:r>
+              <a:rPr b="1"/>
+              <a:t>visible</a:t>
+            </a:r>
+            <a:r>
+              <a:rPr/>
+              <a:t> and are linked to efforts to build </a:t>
+            </a:r>
+            <a:r>
+              <a:rPr b="1"/>
+              <a:t>strong ties</a:t>
+            </a:r>
+            <a:r>
+              <a:rPr/>
+              <a:t> with other nations and to </a:t>
+            </a:r>
+            <a:r>
+              <a:rPr b="1"/>
+              <a:t>shape perceptions of Beijing’s priorities</a:t>
+            </a:r>
+            <a:r>
+              <a:rPr/>
+              <a:t>.</a:t>
             </a:r>
           </a:p>
         </p:txBody>
@@ -4436,7 +4417,7 @@
             </a:pPr>
             <a:r>
               <a:rPr/>
-              <a:t>Diplomacy and Media and China’s Foreign Policy</a:t>
+              <a:t>The Importance of Scarcity</a:t>
             </a:r>
           </a:p>
         </p:txBody>
@@ -4456,36 +4437,42 @@
           <a:bodyPr/>
           <a:lstStyle/>
           <a:p>
-            <a:pPr lvl="0" indent="0" marL="0">
-              <a:buNone/>
-            </a:pPr>
-            <a:r>
-              <a:rPr/>
-              <a:t>Visits and outward media coverage are </a:t>
+            <a:pPr lvl="0"/>
+            <a:r>
+              <a:rPr/>
+              <a:t>Visits and coverage provide visible signals about Beijing’s priorities because they are scarce commodities.</a:t>
+            </a:r>
+          </a:p>
+          <a:p>
+            <a:pPr lvl="0"/>
+            <a:r>
+              <a:rPr/>
+              <a:t>Visits require planning and resources to implement.</a:t>
+            </a:r>
+          </a:p>
+          <a:p>
+            <a:pPr lvl="0"/>
+            <a:r>
+              <a:rPr/>
+              <a:t>Writing, editing, and publishing news articles (even online) requires time and money.</a:t>
+            </a:r>
+          </a:p>
+          <a:p>
+            <a:pPr lvl="0"/>
+            <a:r>
+              <a:rPr/>
+              <a:t>Limited resources and bandwidth forces choices about what countries to visit and to highlight in news stories.</a:t>
+            </a:r>
+          </a:p>
+          <a:p>
+            <a:pPr lvl="0"/>
+            <a:r>
+              <a:rPr/>
+              <a:t>Visits and coverage reflect Beijing’s </a:t>
             </a:r>
             <a:r>
               <a:rPr b="1"/>
-              <a:t>visible</a:t>
-            </a:r>
-            <a:r>
-              <a:rPr/>
-              <a:t> and are linked to efforts to build </a:t>
-            </a:r>
-            <a:r>
-              <a:rPr b="1"/>
-              <a:t>strong ties</a:t>
-            </a:r>
-            <a:r>
-              <a:rPr/>
-              <a:t> with other nations and to </a:t>
-            </a:r>
-            <a:r>
-              <a:rPr b="1"/>
-              <a:t>shape perceptions of Beijing’s priorities</a:t>
-            </a:r>
-            <a:r>
-              <a:rPr/>
-              <a:t>.</a:t>
+              <a:t>strategic priorities.</a:t>
             </a:r>
           </a:p>
         </p:txBody>
@@ -4578,7 +4565,7 @@
             </a:pPr>
             <a:r>
               <a:rPr/>
-              <a:t>The Importance of Scarcity</a:t>
+              <a:t>Here’s the Bark…Where’s the Bite?</a:t>
             </a:r>
           </a:p>
         </p:txBody>
@@ -4601,39 +4588,28 @@
             <a:pPr lvl="0"/>
             <a:r>
               <a:rPr/>
-              <a:t>Visits and coverage provide visible signals about Beijing’s priorities because they are scarce commodities.</a:t>
+              <a:t>As important as visits and coverage are for signaling Beijing’s commitments and shaping global perceptions of its priorities…</a:t>
             </a:r>
           </a:p>
           <a:p>
             <a:pPr lvl="0"/>
             <a:r>
               <a:rPr/>
-              <a:t>Visits require planning and resources to implement.</a:t>
+              <a:t>…they are performative acts if they are backed up by no material support.</a:t>
             </a:r>
           </a:p>
           <a:p>
             <a:pPr lvl="0"/>
             <a:r>
               <a:rPr/>
-              <a:t>Writing, editing, and publishing news articles (even online) requires time and money.</a:t>
+              <a:t>Enter global development finance.</a:t>
             </a:r>
           </a:p>
           <a:p>
             <a:pPr lvl="0"/>
             <a:r>
               <a:rPr/>
-              <a:t>Limited resources and bandwidth forces choices about what countries to visit and to highlight in news stories.</a:t>
-            </a:r>
-          </a:p>
-          <a:p>
-            <a:pPr lvl="0"/>
-            <a:r>
-              <a:rPr/>
-              <a:t>Visits and coverage reflect Beijing’s </a:t>
-            </a:r>
-            <a:r>
-              <a:rPr b="1"/>
-              <a:t>strategic priorities.</a:t>
+              <a:t>Beijing uses international aid to complement its visible displays of its priorities.</a:t>
             </a:r>
           </a:p>
         </p:txBody>
@@ -4849,7 +4825,7 @@
             </a:pPr>
             <a:r>
               <a:rPr/>
-              <a:t>Here’s the Bark…Where’s the Bite?</a:t>
+              <a:t>Hypotheses</a:t>
             </a:r>
           </a:p>
         </p:txBody>
@@ -4869,31 +4845,37 @@
           <a:bodyPr/>
           <a:lstStyle/>
           <a:p>
-            <a:pPr lvl="0"/>
-            <a:r>
-              <a:rPr/>
-              <a:t>As important as visits and coverage are for signaling Beijing’s commitments and shaping global perceptions of its priorities…</a:t>
-            </a:r>
-          </a:p>
-          <a:p>
-            <a:pPr lvl="0"/>
-            <a:r>
-              <a:rPr/>
-              <a:t>…they are performative acts if they are backed up by no material support.</a:t>
-            </a:r>
-          </a:p>
-          <a:p>
-            <a:pPr lvl="0"/>
-            <a:r>
-              <a:rPr/>
-              <a:t>Enter global development finance.</a:t>
-            </a:r>
-          </a:p>
-          <a:p>
-            <a:pPr lvl="0"/>
-            <a:r>
-              <a:rPr/>
-              <a:t>Beijing uses international aid to complement its visible displays of its priorities.</a:t>
+            <a:pPr lvl="0" indent="0" marL="0">
+              <a:buNone/>
+            </a:pPr>
+            <a:r>
+              <a:rPr b="1"/>
+              <a:t>H1</a:t>
+            </a:r>
+            <a:r>
+              <a:rPr/>
+              <a:t>: When developing countries receive more media exposure in </a:t>
+            </a:r>
+            <a:r>
+              <a:rPr i="1"/>
+              <a:t>Xinhua</a:t>
+            </a:r>
+            <a:r>
+              <a:rPr/>
+              <a:t>, they receive more foreign aid from China.</a:t>
+            </a:r>
+          </a:p>
+          <a:p>
+            <a:pPr lvl="0" indent="0" marL="0">
+              <a:buNone/>
+            </a:pPr>
+            <a:r>
+              <a:rPr b="1"/>
+              <a:t>H2</a:t>
+            </a:r>
+            <a:r>
+              <a:rPr/>
+              <a:t>: When developing countries host more Chinese high-level diplomatic visits, they receive more foreign aid from China.</a:t>
             </a:r>
           </a:p>
         </p:txBody>
@@ -4950,141 +4932,6 @@
 </file>
 
 <file path=ppt/slides/slide21.xml><?xml version="1.0" encoding="utf-8"?>
-<p:sld xmlns:a="http://schemas.openxmlformats.org/drawingml/2006/main" xmlns:r="http://schemas.openxmlformats.org/officeDocument/2006/relationships" xmlns:p="http://schemas.openxmlformats.org/presentationml/2006/main">
-  <p:cSld>
-    <p:spTree>
-      <p:nvGrpSpPr>
-        <p:cNvPr id="1" name=""/>
-        <p:cNvGrpSpPr/>
-        <p:nvPr/>
-      </p:nvGrpSpPr>
-      <p:grpSpPr>
-        <a:xfrm>
-          <a:off x="0" y="0"/>
-          <a:ext cx="0" cy="0"/>
-          <a:chOff x="0" y="0"/>
-          <a:chExt cx="0" cy="0"/>
-        </a:xfrm>
-      </p:grpSpPr>
-      <p:sp>
-        <p:nvSpPr>
-          <p:cNvPr id="2" name="Title 1"/>
-          <p:cNvSpPr>
-            <a:spLocks noGrp="1"/>
-          </p:cNvSpPr>
-          <p:nvPr>
-            <p:ph type="title"/>
-          </p:nvPr>
-        </p:nvSpPr>
-        <p:spPr/>
-        <p:txBody>
-          <a:bodyPr/>
-          <a:lstStyle/>
-          <a:p>
-            <a:pPr lvl="0" indent="0" marL="0">
-              <a:buNone/>
-            </a:pPr>
-            <a:r>
-              <a:rPr/>
-              <a:t>Hypotheses</a:t>
-            </a:r>
-          </a:p>
-        </p:txBody>
-      </p:sp>
-      <p:sp>
-        <p:nvSpPr>
-          <p:cNvPr id="3" name="Content Placeholder 2"/>
-          <p:cNvSpPr>
-            <a:spLocks noGrp="1"/>
-          </p:cNvSpPr>
-          <p:nvPr>
-            <p:ph idx="1"/>
-          </p:nvPr>
-        </p:nvSpPr>
-        <p:spPr/>
-        <p:txBody>
-          <a:bodyPr/>
-          <a:lstStyle/>
-          <a:p>
-            <a:pPr lvl="0" indent="0" marL="0">
-              <a:buNone/>
-            </a:pPr>
-            <a:r>
-              <a:rPr/>
-              <a:t>H1: When developing countries receive more media exposure in </a:t>
-            </a:r>
-            <a:r>
-              <a:rPr i="1"/>
-              <a:t>Xinhua</a:t>
-            </a:r>
-            <a:r>
-              <a:rPr/>
-              <a:t>, they receive more foreign aid from China.</a:t>
-            </a:r>
-          </a:p>
-          <a:p>
-            <a:pPr lvl="0" indent="0" marL="0">
-              <a:buNone/>
-            </a:pPr>
-            <a:r>
-              <a:rPr/>
-              <a:t>H2: When developing countries host more Chinese high-level diplomatic visits, they receive more foreign aid from China.</a:t>
-            </a:r>
-          </a:p>
-        </p:txBody>
-      </p:sp>
-      <p:sp>
-        <p:nvSpPr>
-          <p:cNvPr id="4" name="Date Placeholder 3"/>
-          <p:cNvSpPr>
-            <a:spLocks noGrp="1"/>
-          </p:cNvSpPr>
-          <p:nvPr>
-            <p:ph idx="10" sz="half" type="dt"/>
-          </p:nvPr>
-        </p:nvSpPr>
-        <p:spPr/>
-        <p:txBody>
-          <a:bodyPr/>
-          <a:lstStyle/>
-          <a:p>
-            <a:r>
-              <a:rPr lang="en-US" smtClean="0"/>
-              <a:t>June 24, 2022</a:t>
-            </a:r>
-            <a:endParaRPr lang="en-US"/>
-          </a:p>
-        </p:txBody>
-      </p:sp>
-      <p:sp>
-        <p:nvSpPr>
-          <p:cNvPr id="6" name="Slide Number Placeholder 5"/>
-          <p:cNvSpPr>
-            <a:spLocks noGrp="1"/>
-          </p:cNvSpPr>
-          <p:nvPr>
-            <p:ph idx="12" sz="quarter" type="sldNum"/>
-          </p:nvPr>
-        </p:nvSpPr>
-        <p:spPr/>
-        <p:txBody>
-          <a:bodyPr/>
-          <a:lstStyle/>
-          <a:p>
-            <a:fld id="{97EA7C9C-6196-4EEE-BF90-A4DA6D831FB5}" type="slidenum">
-              <a:rPr lang="en-US" smtClean="0"/>
-              <a:t>‹#›</a:t>
-            </a:fld>
-            <a:endParaRPr lang="en-US"/>
-          </a:p>
-        </p:txBody>
-      </p:sp>
-    </p:spTree>
-  </p:cSld>
-</p:sld>
-</file>
-
-<file path=ppt/slides/slide22.xml><?xml version="1.0" encoding="utf-8"?>
 <p:sld xmlns:a="http://schemas.openxmlformats.org/drawingml/2006/main" xmlns:r="http://schemas.openxmlformats.org/officeDocument/2006/relationships" xmlns:p="http://schemas.openxmlformats.org/presentationml/2006/main">
   <p:cSld>
     <p:spTree>
@@ -5443,7 +5290,7 @@
 </p:sld>
 </file>
 
-<file path=ppt/slides/slide23.xml><?xml version="1.0" encoding="utf-8"?>
+<file path=ppt/slides/slide22.xml><?xml version="1.0" encoding="utf-8"?>
 <p:sld xmlns:a="http://schemas.openxmlformats.org/drawingml/2006/main" xmlns:r="http://schemas.openxmlformats.org/officeDocument/2006/relationships" xmlns:p="http://schemas.openxmlformats.org/presentationml/2006/main">
   <p:cSld>
     <p:spTree>
@@ -5566,7 +5413,7 @@
 </p:sld>
 </file>
 
-<file path=ppt/slides/slide24.xml><?xml version="1.0" encoding="utf-8"?>
+<file path=ppt/slides/slide23.xml><?xml version="1.0" encoding="utf-8"?>
 <p:sld xmlns:a="http://schemas.openxmlformats.org/drawingml/2006/main" xmlns:r="http://schemas.openxmlformats.org/officeDocument/2006/relationships" xmlns:p="http://schemas.openxmlformats.org/presentationml/2006/main">
   <p:cSld>
     <p:spTree>
@@ -5689,6 +5536,143 @@
 </p:sld>
 </file>
 
+<file path=ppt/slides/slide24.xml><?xml version="1.0" encoding="utf-8"?>
+<p:sld xmlns:a="http://schemas.openxmlformats.org/drawingml/2006/main" xmlns:r="http://schemas.openxmlformats.org/officeDocument/2006/relationships" xmlns:p="http://schemas.openxmlformats.org/presentationml/2006/main">
+  <p:cSld>
+    <p:spTree>
+      <p:nvGrpSpPr>
+        <p:cNvPr id="1" name=""/>
+        <p:cNvGrpSpPr/>
+        <p:nvPr/>
+      </p:nvGrpSpPr>
+      <p:grpSpPr>
+        <a:xfrm>
+          <a:off x="0" y="0"/>
+          <a:ext cx="0" cy="0"/>
+          <a:chOff x="0" y="0"/>
+          <a:chExt cx="0" cy="0"/>
+        </a:xfrm>
+      </p:grpSpPr>
+      <p:sp>
+        <p:nvSpPr>
+          <p:cNvPr id="2" name="Title 1"/>
+          <p:cNvSpPr>
+            <a:spLocks noGrp="1"/>
+          </p:cNvSpPr>
+          <p:nvPr>
+            <p:ph type="title"/>
+          </p:nvPr>
+        </p:nvSpPr>
+        <p:spPr/>
+        <p:txBody>
+          <a:bodyPr/>
+          <a:lstStyle/>
+          <a:p>
+            <a:pPr lvl="0" indent="0" marL="0">
+              <a:buNone/>
+            </a:pPr>
+            <a:r>
+              <a:rPr/>
+              <a:t>Conclusion</a:t>
+            </a:r>
+          </a:p>
+        </p:txBody>
+      </p:sp>
+      <p:sp>
+        <p:nvSpPr>
+          <p:cNvPr id="3" name="Content Placeholder 2"/>
+          <p:cNvSpPr>
+            <a:spLocks noGrp="1"/>
+          </p:cNvSpPr>
+          <p:nvPr>
+            <p:ph idx="1"/>
+          </p:nvPr>
+        </p:nvSpPr>
+        <p:spPr/>
+        <p:txBody>
+          <a:bodyPr/>
+          <a:lstStyle/>
+          <a:p>
+            <a:pPr lvl="0"/>
+            <a:r>
+              <a:rPr/>
+              <a:t>Despite limited visibility through traditional means, China’s global development finance serves a very public set of objectives.</a:t>
+            </a:r>
+          </a:p>
+          <a:p>
+            <a:pPr lvl="0"/>
+            <a:r>
+              <a:rPr/>
+              <a:t>Beijing leverages aid in support of such goals by complementing visible acts that signal its priorities with greater foreign aid spending.</a:t>
+            </a:r>
+          </a:p>
+          <a:p>
+            <a:pPr lvl="0"/>
+            <a:r>
+              <a:rPr/>
+              <a:t>These findings not only support the view that China’s aid is partly in service of public diplomacy…</a:t>
+            </a:r>
+          </a:p>
+          <a:p>
+            <a:pPr lvl="0"/>
+            <a:r>
+              <a:rPr/>
+              <a:t>…but also show how aid supports this objective.</a:t>
+            </a:r>
+          </a:p>
+        </p:txBody>
+      </p:sp>
+      <p:sp>
+        <p:nvSpPr>
+          <p:cNvPr id="4" name="Date Placeholder 3"/>
+          <p:cNvSpPr>
+            <a:spLocks noGrp="1"/>
+          </p:cNvSpPr>
+          <p:nvPr>
+            <p:ph idx="10" sz="half" type="dt"/>
+          </p:nvPr>
+        </p:nvSpPr>
+        <p:spPr/>
+        <p:txBody>
+          <a:bodyPr/>
+          <a:lstStyle/>
+          <a:p>
+            <a:r>
+              <a:rPr lang="en-US" smtClean="0"/>
+              <a:t>June 24, 2022</a:t>
+            </a:r>
+            <a:endParaRPr lang="en-US"/>
+          </a:p>
+        </p:txBody>
+      </p:sp>
+      <p:sp>
+        <p:nvSpPr>
+          <p:cNvPr id="6" name="Slide Number Placeholder 5"/>
+          <p:cNvSpPr>
+            <a:spLocks noGrp="1"/>
+          </p:cNvSpPr>
+          <p:nvPr>
+            <p:ph idx="12" sz="quarter" type="sldNum"/>
+          </p:nvPr>
+        </p:nvSpPr>
+        <p:spPr/>
+        <p:txBody>
+          <a:bodyPr/>
+          <a:lstStyle/>
+          <a:p>
+            <a:fld id="{97EA7C9C-6196-4EEE-BF90-A4DA6D831FB5}" type="slidenum">
+              <a:rPr lang="en-US" smtClean="0"/>
+              <a:t>‹#›</a:t>
+            </a:fld>
+            <a:endParaRPr lang="en-US"/>
+          </a:p>
+        </p:txBody>
+      </p:sp>
+    </p:spTree>
+  </p:cSld>
+</p:sld>
+</file>
+
 <file path=ppt/slides/slide25.xml><?xml version="1.0" encoding="utf-8"?>
 <p:sld xmlns:a="http://schemas.openxmlformats.org/drawingml/2006/main" xmlns:r="http://schemas.openxmlformats.org/officeDocument/2006/relationships" xmlns:p="http://schemas.openxmlformats.org/presentationml/2006/main">
   <p:cSld>
@@ -5726,7 +5710,7 @@
             </a:pPr>
             <a:r>
               <a:rPr/>
-              <a:t>Conclusion</a:t>
+              <a:t>Thank You</a:t>
             </a:r>
           </a:p>
         </p:txBody>
@@ -5746,31 +5730,29 @@
           <a:bodyPr/>
           <a:lstStyle/>
           <a:p>
-            <a:pPr lvl="0"/>
-            <a:r>
-              <a:rPr/>
-              <a:t>Despite limited visibility through traditional means, China’s global development finance serves a very public set of objectives.</a:t>
-            </a:r>
-          </a:p>
-          <a:p>
-            <a:pPr lvl="0"/>
-            <a:r>
-              <a:rPr/>
-              <a:t>Beijing leverages aid in support of such goals by complementing visible acts that signal its priorities with greater foreign aid spending.</a:t>
-            </a:r>
-          </a:p>
-          <a:p>
-            <a:pPr lvl="0"/>
-            <a:r>
-              <a:rPr/>
-              <a:t>These findings not only support the view that China’s aid is partly in service of public diplomacy…</a:t>
-            </a:r>
-          </a:p>
-          <a:p>
-            <a:pPr lvl="0"/>
-            <a:r>
-              <a:rPr/>
-              <a:t>…but also show how aid supports this objective.</a:t>
+            <a:pPr lvl="0" indent="0" marL="0">
+              <a:buNone/>
+            </a:pPr>
+            <a:r>
+              <a:rPr b="1"/>
+              <a:t>Miles D. Williams</a:t>
+            </a:r>
+            <a:r>
+              <a:rPr/>
+              <a:t>: milesdw2@illinois.edu</a:t>
+            </a:r>
+          </a:p>
+          <a:p>
+            <a:pPr lvl="0" indent="0" marL="0">
+              <a:buNone/>
+            </a:pPr>
+            <a:r>
+              <a:rPr b="1"/>
+              <a:t>Lucie Lu</a:t>
+            </a:r>
+            <a:r>
+              <a:rPr/>
+              <a:t>: lul3@illinois.edu</a:t>
             </a:r>
           </a:p>
         </p:txBody>
@@ -5827,133 +5809,6 @@
 </file>
 
 <file path=ppt/slides/slide26.xml><?xml version="1.0" encoding="utf-8"?>
-<p:sld xmlns:a="http://schemas.openxmlformats.org/drawingml/2006/main" xmlns:r="http://schemas.openxmlformats.org/officeDocument/2006/relationships" xmlns:p="http://schemas.openxmlformats.org/presentationml/2006/main">
-  <p:cSld>
-    <p:spTree>
-      <p:nvGrpSpPr>
-        <p:cNvPr id="1" name=""/>
-        <p:cNvGrpSpPr/>
-        <p:nvPr/>
-      </p:nvGrpSpPr>
-      <p:grpSpPr>
-        <a:xfrm>
-          <a:off x="0" y="0"/>
-          <a:ext cx="0" cy="0"/>
-          <a:chOff x="0" y="0"/>
-          <a:chExt cx="0" cy="0"/>
-        </a:xfrm>
-      </p:grpSpPr>
-      <p:sp>
-        <p:nvSpPr>
-          <p:cNvPr id="2" name="Title 1"/>
-          <p:cNvSpPr>
-            <a:spLocks noGrp="1"/>
-          </p:cNvSpPr>
-          <p:nvPr>
-            <p:ph type="title"/>
-          </p:nvPr>
-        </p:nvSpPr>
-        <p:spPr/>
-        <p:txBody>
-          <a:bodyPr/>
-          <a:lstStyle/>
-          <a:p>
-            <a:pPr lvl="0" indent="0" marL="0">
-              <a:buNone/>
-            </a:pPr>
-            <a:r>
-              <a:rPr/>
-              <a:t>Thank You</a:t>
-            </a:r>
-          </a:p>
-        </p:txBody>
-      </p:sp>
-      <p:sp>
-        <p:nvSpPr>
-          <p:cNvPr id="3" name="Content Placeholder 2"/>
-          <p:cNvSpPr>
-            <a:spLocks noGrp="1"/>
-          </p:cNvSpPr>
-          <p:nvPr>
-            <p:ph idx="1"/>
-          </p:nvPr>
-        </p:nvSpPr>
-        <p:spPr/>
-        <p:txBody>
-          <a:bodyPr/>
-          <a:lstStyle/>
-          <a:p>
-            <a:pPr lvl="0" indent="0" marL="0">
-              <a:buNone/>
-            </a:pPr>
-            <a:r>
-              <a:rPr/>
-              <a:t>Miles D. Williams: milesdw2@illinois.edu</a:t>
-            </a:r>
-          </a:p>
-          <a:p>
-            <a:pPr lvl="0" indent="0" marL="0">
-              <a:buNone/>
-            </a:pPr>
-            <a:r>
-              <a:rPr/>
-              <a:t>Lucie Lu: lul3@illinois.edu</a:t>
-            </a:r>
-          </a:p>
-        </p:txBody>
-      </p:sp>
-      <p:sp>
-        <p:nvSpPr>
-          <p:cNvPr id="4" name="Date Placeholder 3"/>
-          <p:cNvSpPr>
-            <a:spLocks noGrp="1"/>
-          </p:cNvSpPr>
-          <p:nvPr>
-            <p:ph idx="10" sz="half" type="dt"/>
-          </p:nvPr>
-        </p:nvSpPr>
-        <p:spPr/>
-        <p:txBody>
-          <a:bodyPr/>
-          <a:lstStyle/>
-          <a:p>
-            <a:r>
-              <a:rPr lang="en-US" smtClean="0"/>
-              <a:t>June 24, 2022</a:t>
-            </a:r>
-            <a:endParaRPr lang="en-US"/>
-          </a:p>
-        </p:txBody>
-      </p:sp>
-      <p:sp>
-        <p:nvSpPr>
-          <p:cNvPr id="6" name="Slide Number Placeholder 5"/>
-          <p:cNvSpPr>
-            <a:spLocks noGrp="1"/>
-          </p:cNvSpPr>
-          <p:nvPr>
-            <p:ph idx="12" sz="quarter" type="sldNum"/>
-          </p:nvPr>
-        </p:nvSpPr>
-        <p:spPr/>
-        <p:txBody>
-          <a:bodyPr/>
-          <a:lstStyle/>
-          <a:p>
-            <a:fld id="{97EA7C9C-6196-4EEE-BF90-A4DA6D831FB5}" type="slidenum">
-              <a:rPr lang="en-US" smtClean="0"/>
-              <a:t>‹#›</a:t>
-            </a:fld>
-            <a:endParaRPr lang="en-US"/>
-          </a:p>
-        </p:txBody>
-      </p:sp>
-    </p:spTree>
-  </p:cSld>
-</p:sld>
-</file>
-
-<file path=ppt/slides/slide27.xml><?xml version="1.0" encoding="utf-8"?>
 <p:sld xmlns:a="http://schemas.openxmlformats.org/drawingml/2006/main" xmlns:r="http://schemas.openxmlformats.org/officeDocument/2006/relationships" xmlns:p="http://schemas.openxmlformats.org/presentationml/2006/main">
   <p:cSld>
     <p:spTree>
@@ -6655,12 +6510,24 @@
           <a:bodyPr/>
           <a:lstStyle/>
           <a:p>
-            <a:pPr lvl="0" indent="0" marL="0">
-              <a:buNone/>
-            </a:pPr>
-            <a:r>
-              <a:rPr/>
-              <a:t>The obscurity may have more to do with capacity than intention (Dreher et al. 2018).</a:t>
+            <a:pPr lvl="0"/>
+            <a:r>
+              <a:rPr/>
+              <a:t>Some argue that this is an intentional and strategic choice.</a:t>
+            </a:r>
+          </a:p>
+          <a:p>
+            <a:pPr lvl="0"/>
+            <a:r>
+              <a:rPr/>
+              <a:t>But it may have more to do with capacity (Dreher et al. 2018).</a:t>
+            </a:r>
+          </a:p>
+          <a:p>
+            <a:pPr lvl="0"/>
+            <a:r>
+              <a:rPr/>
+              <a:t>Limited transparency remains nonetheless.</a:t>
             </a:r>
           </a:p>
         </p:txBody>
@@ -6753,7 +6620,7 @@
             </a:pPr>
             <a:r>
               <a:rPr/>
-              <a:t>Puzzle</a:t>
+              <a:t>Research Question and Argument</a:t>
             </a:r>
           </a:p>
         </p:txBody>
@@ -6777,8 +6644,12 @@
               <a:buNone/>
             </a:pPr>
             <a:r>
-              <a:rPr/>
-              <a:t>But transparency remains.</a:t>
+              <a:rPr b="1"/>
+              <a:t>The Puzzle</a:t>
+            </a:r>
+            <a:r>
+              <a:rPr/>
+              <a:t>: Absent traditional modes of transparency, how does Beijing leverage its international development finance in service of its diplomatic and legitimacy-seeking objectives?</a:t>
             </a:r>
           </a:p>
         </p:txBody>
@@ -6896,11 +6767,19 @@
             </a:pPr>
             <a:r>
               <a:rPr b="1"/>
-              <a:t>The Puzzle</a:t>
-            </a:r>
-            <a:r>
-              <a:rPr/>
-              <a:t>: Absent traditional modes of transparency, how does Beijing leverage its international development finance in service of its diplomatic and legitimacy-seeking objectives?</a:t>
+              <a:t>The Answer</a:t>
+            </a:r>
+            <a:r>
+              <a:rPr/>
+              <a:t>: China complements other </a:t>
+            </a:r>
+            <a:r>
+              <a:rPr b="1"/>
+              <a:t>visible</a:t>
+            </a:r>
+            <a:r>
+              <a:rPr/>
+              <a:t> public diplomacy and legitimacy-seeking activities with greater development finance.</a:t>
             </a:r>
           </a:p>
         </p:txBody>
@@ -6993,7 +6872,7 @@
             </a:pPr>
             <a:r>
               <a:rPr/>
-              <a:t>Research Question and Argument</a:t>
+              <a:t>Our Data</a:t>
             </a:r>
           </a:p>
         </p:txBody>
@@ -7017,20 +6896,62 @@
               <a:buNone/>
             </a:pPr>
             <a:r>
+              <a:rPr/>
+              <a:t>Explanatory Variables:</a:t>
+            </a:r>
+          </a:p>
+          <a:p>
+            <a:pPr lvl="0"/>
+            <a:r>
               <a:rPr b="1"/>
-              <a:t>The Answer</a:t>
-            </a:r>
-            <a:r>
-              <a:rPr/>
-              <a:t>: China complements other </a:t>
-            </a:r>
+              <a:t>Bilateral Diplomatic Visits</a:t>
+            </a:r>
+            <a:r>
+              <a:rPr/>
+              <a:t> - AidData’s </a:t>
+            </a:r>
+            <a:r>
+              <a:rPr i="1"/>
+              <a:t>China’s Public Diplomacy Dashboard</a:t>
+            </a:r>
+          </a:p>
+          <a:p>
+            <a:pPr lvl="0"/>
             <a:r>
               <a:rPr b="1"/>
-              <a:t>visible</a:t>
-            </a:r>
-            <a:r>
-              <a:rPr/>
-              <a:t> public diplomacy and legitimacy-seeking activities with greater development finance.</a:t>
+              <a:t>State-run Media Coverage</a:t>
+            </a:r>
+            <a:r>
+              <a:rPr/>
+              <a:t> - Cline Center for Advanced Social Research’s </a:t>
+            </a:r>
+            <a:r>
+              <a:rPr i="1"/>
+              <a:t>Global News Index and Extracted Features Repository</a:t>
+            </a:r>
+          </a:p>
+          <a:p>
+            <a:pPr lvl="0" indent="0" marL="0">
+              <a:buNone/>
+            </a:pPr>
+            <a:r>
+              <a:rPr/>
+              <a:t>Outcome:</a:t>
+            </a:r>
+          </a:p>
+          <a:p>
+            <a:pPr lvl="0"/>
+            <a:r>
+              <a:rPr b="1"/>
+              <a:t>Bilateral Development Assistance</a:t>
+            </a:r>
+            <a:r>
+              <a:rPr/>
+              <a:t> - AidData’s </a:t>
+            </a:r>
+            <a:r>
+              <a:rPr i="1"/>
+              <a:t>Global Chinese Development Finance Dataset</a:t>
             </a:r>
           </a:p>
         </p:txBody>

</xml_diff>